<commit_message>
Update presentation files for Rares and Ana
</commit_message>
<xml_diff>
--- a/_Documents/Rares&Ana/Prezentare ANA - Chatbot.pptx
+++ b/_Documents/Rares&Ana/Prezentare ANA - Chatbot.pptx
@@ -5,7 +5,7 @@
     <p:sldMasterId id="2147483659" r:id="rId1"/>
   </p:sldMasterIdLst>
   <p:notesMasterIdLst>
-    <p:notesMasterId r:id="rId13"/>
+    <p:notesMasterId r:id="rId12"/>
   </p:notesMasterIdLst>
   <p:sldIdLst>
     <p:sldId id="256" r:id="rId2"/>
@@ -17,16 +17,15 @@
     <p:sldId id="264" r:id="rId8"/>
     <p:sldId id="265" r:id="rId9"/>
     <p:sldId id="266" r:id="rId10"/>
-    <p:sldId id="258" r:id="rId11"/>
-    <p:sldId id="259" r:id="rId12"/>
+    <p:sldId id="259" r:id="rId11"/>
   </p:sldIdLst>
   <p:sldSz cx="9144000" cy="5143500" type="screen16x9"/>
   <p:notesSz cx="6858000" cy="9144000"/>
   <p:embeddedFontLst>
     <p:embeddedFont>
       <p:font typeface="Recursive" panose="020B0604020202020204" charset="0"/>
-      <p:regular r:id="rId14"/>
-      <p:bold r:id="rId15"/>
+      <p:regular r:id="rId13"/>
+      <p:bold r:id="rId14"/>
     </p:embeddedFont>
   </p:embeddedFontLst>
   <p:defaultTextStyle>
@@ -897,110 +896,6 @@
 </file>
 
 <file path=ppt/notesSlides/notesSlide10.xml><?xml version="1.0" encoding="utf-8"?>
-<p:notes xmlns:a="http://schemas.openxmlformats.org/drawingml/2006/main" xmlns:r="http://schemas.openxmlformats.org/officeDocument/2006/relationships" xmlns:p="http://schemas.openxmlformats.org/presentationml/2006/main" showMasterSp="0" showMasterPhAnim="0">
-  <p:cSld>
-    <p:spTree>
-      <p:nvGrpSpPr>
-        <p:cNvPr id="1" name="Shape 79"/>
-        <p:cNvGrpSpPr/>
-        <p:nvPr/>
-      </p:nvGrpSpPr>
-      <p:grpSpPr>
-        <a:xfrm>
-          <a:off x="0" y="0"/>
-          <a:ext cx="0" cy="0"/>
-          <a:chOff x="0" y="0"/>
-          <a:chExt cx="0" cy="0"/>
-        </a:xfrm>
-      </p:grpSpPr>
-      <p:sp>
-        <p:nvSpPr>
-          <p:cNvPr id="80" name="Google Shape;80;g35a0f3172a0_0_26:notes"/>
-          <p:cNvSpPr>
-            <a:spLocks noGrp="1" noRot="1" noChangeAspect="1"/>
-          </p:cNvSpPr>
-          <p:nvPr>
-            <p:ph type="sldImg" idx="2"/>
-          </p:nvPr>
-        </p:nvSpPr>
-        <p:spPr>
-          <a:xfrm>
-            <a:off x="381000" y="685800"/>
-            <a:ext cx="6096000" cy="3429000"/>
-          </a:xfrm>
-          <a:custGeom>
-            <a:avLst/>
-            <a:gdLst/>
-            <a:ahLst/>
-            <a:cxnLst/>
-            <a:rect l="l" t="t" r="r" b="b"/>
-            <a:pathLst>
-              <a:path w="120000" h="120000" extrusionOk="0">
-                <a:moveTo>
-                  <a:pt x="0" y="0"/>
-                </a:moveTo>
-                <a:lnTo>
-                  <a:pt x="120000" y="0"/>
-                </a:lnTo>
-                <a:lnTo>
-                  <a:pt x="120000" y="120000"/>
-                </a:lnTo>
-                <a:lnTo>
-                  <a:pt x="0" y="120000"/>
-                </a:lnTo>
-                <a:close/>
-              </a:path>
-            </a:pathLst>
-          </a:custGeom>
-        </p:spPr>
-      </p:sp>
-      <p:sp>
-        <p:nvSpPr>
-          <p:cNvPr id="81" name="Google Shape;81;g35a0f3172a0_0_26:notes"/>
-          <p:cNvSpPr txBox="1">
-            <a:spLocks noGrp="1"/>
-          </p:cNvSpPr>
-          <p:nvPr>
-            <p:ph type="body" idx="1"/>
-          </p:nvPr>
-        </p:nvSpPr>
-        <p:spPr>
-          <a:xfrm>
-            <a:off x="685800" y="4343400"/>
-            <a:ext cx="5486400" cy="4114800"/>
-          </a:xfrm>
-          <a:prstGeom prst="rect">
-            <a:avLst/>
-          </a:prstGeom>
-        </p:spPr>
-        <p:txBody>
-          <a:bodyPr spcFirstLastPara="1" wrap="square" lIns="91425" tIns="91425" rIns="91425" bIns="91425" anchor="t" anchorCtr="0">
-            <a:noAutofit/>
-          </a:bodyPr>
-          <a:lstStyle/>
-          <a:p>
-            <a:pPr marL="0" lvl="0" indent="0" algn="l" rtl="0">
-              <a:spcBef>
-                <a:spcPts val="0"/>
-              </a:spcBef>
-              <a:spcAft>
-                <a:spcPts val="0"/>
-              </a:spcAft>
-              <a:buNone/>
-            </a:pPr>
-            <a:endParaRPr/>
-          </a:p>
-        </p:txBody>
-      </p:sp>
-    </p:spTree>
-  </p:cSld>
-  <p:clrMapOvr>
-    <a:masterClrMapping/>
-  </p:clrMapOvr>
-</p:notes>
-</file>
-
-<file path=ppt/notesSlides/notesSlide11.xml><?xml version="1.0" encoding="utf-8"?>
 <p:notes xmlns:a="http://schemas.openxmlformats.org/drawingml/2006/main" xmlns:r="http://schemas.openxmlformats.org/officeDocument/2006/relationships" xmlns:p="http://schemas.openxmlformats.org/presentationml/2006/main" showMasterSp="0" showMasterPhAnim="0">
   <p:cSld>
     <p:spTree>
@@ -7183,518 +7078,6 @@
   <p:cSld>
     <p:spTree>
       <p:nvGrpSpPr>
-        <p:cNvPr id="1" name="Shape 82"/>
-        <p:cNvGrpSpPr/>
-        <p:nvPr/>
-      </p:nvGrpSpPr>
-      <p:grpSpPr>
-        <a:xfrm>
-          <a:off x="0" y="0"/>
-          <a:ext cx="0" cy="0"/>
-          <a:chOff x="0" y="0"/>
-          <a:chExt cx="0" cy="0"/>
-        </a:xfrm>
-      </p:grpSpPr>
-      <p:pic>
-        <p:nvPicPr>
-          <p:cNvPr id="83" name="Google Shape;83;p15"/>
-          <p:cNvPicPr preferRelativeResize="0"/>
-          <p:nvPr/>
-        </p:nvPicPr>
-        <p:blipFill>
-          <a:blip r:embed="rId3">
-            <a:alphaModFix amt="4000"/>
-          </a:blip>
-          <a:stretch>
-            <a:fillRect/>
-          </a:stretch>
-        </p:blipFill>
-        <p:spPr>
-          <a:xfrm>
-            <a:off x="4100" y="2650"/>
-            <a:ext cx="9144000" cy="5143500"/>
-          </a:xfrm>
-          <a:prstGeom prst="rect">
-            <a:avLst/>
-          </a:prstGeom>
-          <a:noFill/>
-          <a:ln>
-            <a:noFill/>
-          </a:ln>
-        </p:spPr>
-      </p:pic>
-      <p:sp>
-        <p:nvSpPr>
-          <p:cNvPr id="84" name="Google Shape;84;p15"/>
-          <p:cNvSpPr txBox="1">
-            <a:spLocks noGrp="1"/>
-          </p:cNvSpPr>
-          <p:nvPr>
-            <p:ph type="title"/>
-          </p:nvPr>
-        </p:nvSpPr>
-        <p:spPr>
-          <a:xfrm>
-            <a:off x="274825" y="242250"/>
-            <a:ext cx="8520600" cy="572700"/>
-          </a:xfrm>
-          <a:prstGeom prst="rect">
-            <a:avLst/>
-          </a:prstGeom>
-        </p:spPr>
-        <p:txBody>
-          <a:bodyPr spcFirstLastPara="1" wrap="square" lIns="91425" tIns="91425" rIns="91425" bIns="91425" anchor="t" anchorCtr="0">
-            <a:normAutofit fontScale="90000"/>
-          </a:bodyPr>
-          <a:lstStyle/>
-          <a:p>
-            <a:pPr marL="0" lvl="0" indent="0" algn="l" rtl="0">
-              <a:spcBef>
-                <a:spcPts val="0"/>
-              </a:spcBef>
-              <a:spcAft>
-                <a:spcPts val="0"/>
-              </a:spcAft>
-              <a:buNone/>
-            </a:pPr>
-            <a:r>
-              <a:rPr lang="en">
-                <a:latin typeface="Recursive"/>
-                <a:ea typeface="Recursive"/>
-                <a:cs typeface="Recursive"/>
-                <a:sym typeface="Recursive"/>
-              </a:rPr>
-              <a:t>Sample Heading With Picture</a:t>
-            </a:r>
-            <a:endParaRPr>
-              <a:latin typeface="Recursive"/>
-              <a:ea typeface="Recursive"/>
-              <a:cs typeface="Recursive"/>
-              <a:sym typeface="Recursive"/>
-            </a:endParaRPr>
-          </a:p>
-        </p:txBody>
-      </p:sp>
-      <p:sp>
-        <p:nvSpPr>
-          <p:cNvPr id="85" name="Google Shape;85;p15"/>
-          <p:cNvSpPr txBox="1">
-            <a:spLocks noGrp="1"/>
-          </p:cNvSpPr>
-          <p:nvPr>
-            <p:ph type="body" idx="1"/>
-          </p:nvPr>
-        </p:nvSpPr>
-        <p:spPr>
-          <a:xfrm>
-            <a:off x="717275" y="995775"/>
-            <a:ext cx="8520600" cy="3416400"/>
-          </a:xfrm>
-          <a:prstGeom prst="rect">
-            <a:avLst/>
-          </a:prstGeom>
-        </p:spPr>
-        <p:txBody>
-          <a:bodyPr spcFirstLastPara="1" wrap="square" lIns="91425" tIns="91425" rIns="91425" bIns="91425" anchor="t" anchorCtr="0">
-            <a:normAutofit/>
-          </a:bodyPr>
-          <a:lstStyle/>
-          <a:p>
-            <a:pPr marL="0" lvl="0" indent="0" algn="l" rtl="0">
-              <a:spcBef>
-                <a:spcPts val="0"/>
-              </a:spcBef>
-              <a:spcAft>
-                <a:spcPts val="0"/>
-              </a:spcAft>
-              <a:buNone/>
-            </a:pPr>
-            <a:r>
-              <a:rPr lang="en"/>
-              <a:t>Sample text:</a:t>
-            </a:r>
-            <a:endParaRPr/>
-          </a:p>
-          <a:p>
-            <a:pPr marL="457200" lvl="0" indent="-342900" algn="l" rtl="0">
-              <a:spcBef>
-                <a:spcPts val="1200"/>
-              </a:spcBef>
-              <a:spcAft>
-                <a:spcPts val="0"/>
-              </a:spcAft>
-              <a:buSzPts val="1800"/>
-              <a:buChar char="❖"/>
-            </a:pPr>
-            <a:r>
-              <a:rPr lang="en"/>
-              <a:t>Point 1</a:t>
-            </a:r>
-            <a:endParaRPr/>
-          </a:p>
-          <a:p>
-            <a:pPr marL="914400" lvl="1" indent="-317500" algn="l" rtl="0">
-              <a:spcBef>
-                <a:spcPts val="0"/>
-              </a:spcBef>
-              <a:spcAft>
-                <a:spcPts val="0"/>
-              </a:spcAft>
-              <a:buSzPts val="1400"/>
-              <a:buChar char="➢"/>
-            </a:pPr>
-            <a:r>
-              <a:rPr lang="en"/>
-              <a:t>Sub-topic 1</a:t>
-            </a:r>
-            <a:endParaRPr/>
-          </a:p>
-          <a:p>
-            <a:pPr marL="914400" lvl="1" indent="-317500" algn="l" rtl="0">
-              <a:spcBef>
-                <a:spcPts val="0"/>
-              </a:spcBef>
-              <a:spcAft>
-                <a:spcPts val="0"/>
-              </a:spcAft>
-              <a:buSzPts val="1400"/>
-              <a:buChar char="➢"/>
-            </a:pPr>
-            <a:r>
-              <a:rPr lang="en"/>
-              <a:t>Sub-topic 2</a:t>
-            </a:r>
-            <a:endParaRPr/>
-          </a:p>
-          <a:p>
-            <a:pPr marL="457200" lvl="0" indent="-342900" algn="l" rtl="0">
-              <a:spcBef>
-                <a:spcPts val="0"/>
-              </a:spcBef>
-              <a:spcAft>
-                <a:spcPts val="0"/>
-              </a:spcAft>
-              <a:buSzPts val="1800"/>
-              <a:buChar char="❖"/>
-            </a:pPr>
-            <a:r>
-              <a:rPr lang="en"/>
-              <a:t>Point 2</a:t>
-            </a:r>
-            <a:endParaRPr/>
-          </a:p>
-          <a:p>
-            <a:pPr marL="914400" lvl="1" indent="-317500" algn="l" rtl="0">
-              <a:spcBef>
-                <a:spcPts val="0"/>
-              </a:spcBef>
-              <a:spcAft>
-                <a:spcPts val="0"/>
-              </a:spcAft>
-              <a:buSzPts val="1400"/>
-              <a:buChar char="➢"/>
-            </a:pPr>
-            <a:r>
-              <a:rPr lang="en"/>
-              <a:t>Sub-topic 3</a:t>
-            </a:r>
-            <a:endParaRPr/>
-          </a:p>
-          <a:p>
-            <a:pPr marL="457200" lvl="0" indent="-342900" algn="l" rtl="0">
-              <a:spcBef>
-                <a:spcPts val="0"/>
-              </a:spcBef>
-              <a:spcAft>
-                <a:spcPts val="0"/>
-              </a:spcAft>
-              <a:buSzPts val="1800"/>
-              <a:buChar char="❖"/>
-            </a:pPr>
-            <a:r>
-              <a:rPr lang="en"/>
-              <a:t>Point 3</a:t>
-            </a:r>
-            <a:endParaRPr/>
-          </a:p>
-          <a:p>
-            <a:pPr marL="0" lvl="0" indent="0" algn="l" rtl="0">
-              <a:spcBef>
-                <a:spcPts val="1200"/>
-              </a:spcBef>
-              <a:spcAft>
-                <a:spcPts val="1200"/>
-              </a:spcAft>
-              <a:buNone/>
-            </a:pPr>
-            <a:r>
-              <a:rPr lang="en"/>
-              <a:t>More sample text</a:t>
-            </a:r>
-            <a:endParaRPr/>
-          </a:p>
-        </p:txBody>
-      </p:sp>
-      <p:cxnSp>
-        <p:nvCxnSpPr>
-          <p:cNvPr id="86" name="Google Shape;86;p15"/>
-          <p:cNvCxnSpPr/>
-          <p:nvPr/>
-        </p:nvCxnSpPr>
-        <p:spPr>
-          <a:xfrm>
-            <a:off x="5183275" y="484900"/>
-            <a:ext cx="3466800" cy="0"/>
-          </a:xfrm>
-          <a:prstGeom prst="straightConnector1">
-            <a:avLst/>
-          </a:prstGeom>
-          <a:noFill/>
-          <a:ln w="76200" cap="flat" cmpd="sng">
-            <a:solidFill>
-              <a:srgbClr val="990000"/>
-            </a:solidFill>
-            <a:prstDash val="solid"/>
-            <a:round/>
-            <a:headEnd type="none" w="med" len="med"/>
-            <a:tailEnd type="none" w="med" len="med"/>
-          </a:ln>
-        </p:spPr>
-      </p:cxnSp>
-      <p:cxnSp>
-        <p:nvCxnSpPr>
-          <p:cNvPr id="87" name="Google Shape;87;p15"/>
-          <p:cNvCxnSpPr/>
-          <p:nvPr/>
-        </p:nvCxnSpPr>
-        <p:spPr>
-          <a:xfrm>
-            <a:off x="274825" y="4757625"/>
-            <a:ext cx="7350900" cy="0"/>
-          </a:xfrm>
-          <a:prstGeom prst="straightConnector1">
-            <a:avLst/>
-          </a:prstGeom>
-          <a:noFill/>
-          <a:ln w="76200" cap="flat" cmpd="sng">
-            <a:solidFill>
-              <a:srgbClr val="990000"/>
-            </a:solidFill>
-            <a:prstDash val="solid"/>
-            <a:round/>
-            <a:headEnd type="none" w="med" len="med"/>
-            <a:tailEnd type="none" w="med" len="med"/>
-          </a:ln>
-        </p:spPr>
-      </p:cxnSp>
-      <p:sp>
-        <p:nvSpPr>
-          <p:cNvPr id="88" name="Google Shape;88;p15"/>
-          <p:cNvSpPr txBox="1"/>
-          <p:nvPr/>
-        </p:nvSpPr>
-        <p:spPr>
-          <a:xfrm>
-            <a:off x="274825" y="4802225"/>
-            <a:ext cx="7160700" cy="300000"/>
-          </a:xfrm>
-          <a:prstGeom prst="rect">
-            <a:avLst/>
-          </a:prstGeom>
-          <a:noFill/>
-          <a:ln>
-            <a:noFill/>
-          </a:ln>
-        </p:spPr>
-        <p:txBody>
-          <a:bodyPr spcFirstLastPara="1" wrap="square" lIns="91425" tIns="91425" rIns="91425" bIns="91425" anchor="t" anchorCtr="0">
-            <a:spAutoFit/>
-          </a:bodyPr>
-          <a:lstStyle/>
-          <a:p>
-            <a:pPr marL="0" lvl="0" indent="0" algn="ctr" rtl="0">
-              <a:spcBef>
-                <a:spcPts val="0"/>
-              </a:spcBef>
-              <a:spcAft>
-                <a:spcPts val="0"/>
-              </a:spcAft>
-              <a:buNone/>
-            </a:pPr>
-            <a:r>
-              <a:rPr lang="en" sz="750">
-                <a:solidFill>
-                  <a:srgbClr val="525252"/>
-                </a:solidFill>
-              </a:rPr>
-              <a:t>2025 Copyright © by INPROTED – </a:t>
-            </a:r>
-            <a:r>
-              <a:rPr lang="en" sz="750" b="1">
-                <a:solidFill>
-                  <a:srgbClr val="525252"/>
-                </a:solidFill>
-              </a:rPr>
-              <a:t>I</a:t>
-            </a:r>
-            <a:r>
-              <a:rPr lang="en" sz="750">
-                <a:solidFill>
-                  <a:srgbClr val="525252"/>
-                </a:solidFill>
-              </a:rPr>
-              <a:t>nternational </a:t>
-            </a:r>
-            <a:r>
-              <a:rPr lang="en" sz="750" b="1">
-                <a:solidFill>
-                  <a:srgbClr val="525252"/>
-                </a:solidFill>
-              </a:rPr>
-              <a:t>Pro</a:t>
-            </a:r>
-            <a:r>
-              <a:rPr lang="en" sz="750">
-                <a:solidFill>
-                  <a:srgbClr val="525252"/>
-                </a:solidFill>
-              </a:rPr>
-              <a:t>fessionals for </a:t>
-            </a:r>
-            <a:r>
-              <a:rPr lang="en" sz="750" b="1">
-                <a:solidFill>
-                  <a:srgbClr val="525252"/>
-                </a:solidFill>
-              </a:rPr>
-              <a:t>T</a:t>
-            </a:r>
-            <a:r>
-              <a:rPr lang="en" sz="750">
-                <a:solidFill>
-                  <a:srgbClr val="525252"/>
-                </a:solidFill>
-              </a:rPr>
-              <a:t>echnology and </a:t>
-            </a:r>
-            <a:r>
-              <a:rPr lang="en" sz="750" b="1">
-                <a:solidFill>
-                  <a:srgbClr val="525252"/>
-                </a:solidFill>
-              </a:rPr>
-              <a:t>Ed</a:t>
-            </a:r>
-            <a:r>
-              <a:rPr lang="en" sz="750">
-                <a:solidFill>
-                  <a:srgbClr val="525252"/>
-                </a:solidFill>
-              </a:rPr>
-              <a:t>ucation | All Rights Reserved</a:t>
-            </a:r>
-            <a:endParaRPr>
-              <a:solidFill>
-                <a:schemeClr val="dk1"/>
-              </a:solidFill>
-            </a:endParaRPr>
-          </a:p>
-        </p:txBody>
-      </p:sp>
-      <p:cxnSp>
-        <p:nvCxnSpPr>
-          <p:cNvPr id="89" name="Google Shape;89;p15"/>
-          <p:cNvCxnSpPr/>
-          <p:nvPr/>
-        </p:nvCxnSpPr>
-        <p:spPr>
-          <a:xfrm rot="10800000">
-            <a:off x="4474200" y="1022475"/>
-            <a:ext cx="0" cy="3363000"/>
-          </a:xfrm>
-          <a:prstGeom prst="straightConnector1">
-            <a:avLst/>
-          </a:prstGeom>
-          <a:noFill/>
-          <a:ln w="76200" cap="flat" cmpd="sng">
-            <a:solidFill>
-              <a:srgbClr val="990000"/>
-            </a:solidFill>
-            <a:prstDash val="solid"/>
-            <a:round/>
-            <a:headEnd type="none" w="med" len="med"/>
-            <a:tailEnd type="none" w="med" len="med"/>
-          </a:ln>
-        </p:spPr>
-      </p:cxnSp>
-      <p:pic>
-        <p:nvPicPr>
-          <p:cNvPr id="90" name="Google Shape;90;p15" title="Untitled drawing (4) (1).jpg"/>
-          <p:cNvPicPr preferRelativeResize="0"/>
-          <p:nvPr/>
-        </p:nvPicPr>
-        <p:blipFill rotWithShape="1">
-          <a:blip r:embed="rId4">
-            <a:alphaModFix/>
-          </a:blip>
-          <a:srcRect b="5096"/>
-          <a:stretch/>
-        </p:blipFill>
-        <p:spPr>
-          <a:xfrm>
-            <a:off x="4993863" y="1268326"/>
-            <a:ext cx="3801574" cy="2705887"/>
-          </a:xfrm>
-          <a:prstGeom prst="rect">
-            <a:avLst/>
-          </a:prstGeom>
-          <a:noFill/>
-          <a:ln>
-            <a:noFill/>
-          </a:ln>
-        </p:spPr>
-      </p:pic>
-      <p:pic>
-        <p:nvPicPr>
-          <p:cNvPr id="91" name="Google Shape;91;p15" title="Untitled drawing (4).png"/>
-          <p:cNvPicPr preferRelativeResize="0"/>
-          <p:nvPr/>
-        </p:nvPicPr>
-        <p:blipFill>
-          <a:blip r:embed="rId5">
-            <a:alphaModFix/>
-          </a:blip>
-          <a:stretch>
-            <a:fillRect/>
-          </a:stretch>
-        </p:blipFill>
-        <p:spPr>
-          <a:xfrm>
-            <a:off x="7905125" y="4386525"/>
-            <a:ext cx="1160926" cy="870680"/>
-          </a:xfrm>
-          <a:prstGeom prst="rect">
-            <a:avLst/>
-          </a:prstGeom>
-          <a:noFill/>
-          <a:ln>
-            <a:noFill/>
-          </a:ln>
-        </p:spPr>
-      </p:pic>
-    </p:spTree>
-  </p:cSld>
-  <p:clrMapOvr>
-    <a:masterClrMapping/>
-  </p:clrMapOvr>
-</p:sld>
-</file>
-
-<file path=ppt/slides/slide11.xml><?xml version="1.0" encoding="utf-8"?>
-<p:sld xmlns:a="http://schemas.openxmlformats.org/drawingml/2006/main" xmlns:r="http://schemas.openxmlformats.org/officeDocument/2006/relationships" xmlns:p="http://schemas.openxmlformats.org/presentationml/2006/main">
-  <p:cSld>
-    <p:spTree>
-      <p:nvGrpSpPr>
         <p:cNvPr id="1" name="Shape 95"/>
         <p:cNvGrpSpPr/>
         <p:nvPr/>

</xml_diff>